<commit_message>
Added screenshot to poster. Added units to the plots.
</commit_message>
<xml_diff>
--- a/deliverables/poster.pptx
+++ b/deliverables/poster.pptx
@@ -5455,7 +5455,7 @@
               <a:graphicData uri="http://schemas.openxmlformats.org/presentationml/2006/ole">
                 <mc:AlternateContent xmlns:mc="http://schemas.openxmlformats.org/markup-compatibility/2006">
                   <mc:Choice xmlns:v="urn:schemas-microsoft-com:vml" Requires="v">
-                    <p:oleObj spid="_x0000_s1100" name="Image" r:id="rId8" imgW="1828440" imgH="1117440" progId="Photoshop.Image.13">
+                    <p:oleObj spid="_x0000_s1104" name="Image" r:id="rId8" imgW="1828440" imgH="1117440" progId="Photoshop.Image.13">
                       <p:embed/>
                     </p:oleObj>
                   </mc:Choice>
@@ -5512,7 +5512,7 @@
               <a:graphicData uri="http://schemas.openxmlformats.org/presentationml/2006/ole">
                 <mc:AlternateContent xmlns:mc="http://schemas.openxmlformats.org/markup-compatibility/2006">
                   <mc:Choice xmlns:v="urn:schemas-microsoft-com:vml" Requires="v">
-                    <p:oleObj spid="_x0000_s1101" name="Image" r:id="rId10" imgW="1828440" imgH="1117440" progId="Photoshop.Image.13">
+                    <p:oleObj spid="_x0000_s1105" name="Image" r:id="rId10" imgW="1828440" imgH="1117440" progId="Photoshop.Image.13">
                       <p:embed/>
                     </p:oleObj>
                   </mc:Choice>
@@ -6640,7 +6640,7 @@
             <a:graphicData uri="http://schemas.openxmlformats.org/presentationml/2006/ole">
               <mc:AlternateContent xmlns:mc="http://schemas.openxmlformats.org/markup-compatibility/2006">
                 <mc:Choice xmlns:v="urn:schemas-microsoft-com:vml" Requires="v">
-                  <p:oleObj spid="_x0000_s1102" name="Image" r:id="rId12" imgW="4571280" imgH="1688760" progId="Photoshop.Image.13">
+                  <p:oleObj spid="_x0000_s1106" name="Image" r:id="rId12" imgW="4571280" imgH="1688760" progId="Photoshop.Image.13">
                     <p:embed/>
                   </p:oleObj>
                 </mc:Choice>
@@ -6724,7 +6724,7 @@
             <a:graphicData uri="http://schemas.openxmlformats.org/presentationml/2006/ole">
               <mc:AlternateContent xmlns:mc="http://schemas.openxmlformats.org/markup-compatibility/2006">
                 <mc:Choice xmlns:v="urn:schemas-microsoft-com:vml" Requires="v">
-                  <p:oleObj spid="_x0000_s1103" name="Image" r:id="rId15" imgW="1574280" imgH="1053720" progId="Photoshop.Image.13">
+                  <p:oleObj spid="_x0000_s1107" name="Image" r:id="rId15" imgW="1574280" imgH="1053720" progId="Photoshop.Image.13">
                     <p:embed/>
                   </p:oleObj>
                 </mc:Choice>
@@ -8827,7 +8827,7 @@
             <a:graphicData uri="http://schemas.openxmlformats.org/presentationml/2006/ole">
               <mc:AlternateContent xmlns:mc="http://schemas.openxmlformats.org/markup-compatibility/2006">
                 <mc:Choice xmlns:v="urn:schemas-microsoft-com:vml" Requires="v">
-                  <p:oleObj spid="_x0000_s2124" name="Image" r:id="rId4" imgW="4571280" imgH="1688760" progId="Photoshop.Image.13">
+                  <p:oleObj spid="_x0000_s2128" name="Image" r:id="rId4" imgW="4571280" imgH="1688760" progId="Photoshop.Image.13">
                     <p:embed/>
                   </p:oleObj>
                 </mc:Choice>
@@ -8911,7 +8911,7 @@
             <a:graphicData uri="http://schemas.openxmlformats.org/presentationml/2006/ole">
               <mc:AlternateContent xmlns:mc="http://schemas.openxmlformats.org/markup-compatibility/2006">
                 <mc:Choice xmlns:v="urn:schemas-microsoft-com:vml" Requires="v">
-                  <p:oleObj spid="_x0000_s2125" name="Image" r:id="rId7" imgW="1574280" imgH="1053720" progId="Photoshop.Image.13">
+                  <p:oleObj spid="_x0000_s2129" name="Image" r:id="rId7" imgW="1574280" imgH="1053720" progId="Photoshop.Image.13">
                     <p:embed/>
                   </p:oleObj>
                 </mc:Choice>
@@ -10451,7 +10451,7 @@
               <a:graphicData uri="http://schemas.openxmlformats.org/presentationml/2006/ole">
                 <mc:AlternateContent xmlns:mc="http://schemas.openxmlformats.org/markup-compatibility/2006">
                   <mc:Choice xmlns:v="urn:schemas-microsoft-com:vml" Requires="v">
-                    <p:oleObj spid="_x0000_s2126" name="Image" r:id="rId15" imgW="1828440" imgH="1117440" progId="Photoshop.Image.13">
+                    <p:oleObj spid="_x0000_s2130" name="Image" r:id="rId15" imgW="1828440" imgH="1117440" progId="Photoshop.Image.13">
                       <p:embed/>
                     </p:oleObj>
                   </mc:Choice>
@@ -10508,7 +10508,7 @@
               <a:graphicData uri="http://schemas.openxmlformats.org/presentationml/2006/ole">
                 <mc:AlternateContent xmlns:mc="http://schemas.openxmlformats.org/markup-compatibility/2006">
                   <mc:Choice xmlns:v="urn:schemas-microsoft-com:vml" Requires="v">
-                    <p:oleObj spid="_x0000_s2127" name="Image" r:id="rId17" imgW="1828440" imgH="1117440" progId="Photoshop.Image.13">
+                    <p:oleObj spid="_x0000_s2131" name="Image" r:id="rId17" imgW="1828440" imgH="1117440" progId="Photoshop.Image.13">
                       <p:embed/>
                     </p:oleObj>
                   </mc:Choice>
@@ -12336,7 +12336,7 @@
             <a:graphicData uri="http://schemas.openxmlformats.org/presentationml/2006/ole">
               <mc:AlternateContent xmlns:mc="http://schemas.openxmlformats.org/markup-compatibility/2006">
                 <mc:Choice xmlns:v="urn:schemas-microsoft-com:vml" Requires="v">
-                  <p:oleObj spid="_x0000_s3148" name="Image" r:id="rId4" imgW="4571280" imgH="1688760" progId="Photoshop.Image.13">
+                  <p:oleObj spid="_x0000_s3152" name="Image" r:id="rId4" imgW="4571280" imgH="1688760" progId="Photoshop.Image.13">
                     <p:embed/>
                   </p:oleObj>
                 </mc:Choice>
@@ -12420,7 +12420,7 @@
             <a:graphicData uri="http://schemas.openxmlformats.org/presentationml/2006/ole">
               <mc:AlternateContent xmlns:mc="http://schemas.openxmlformats.org/markup-compatibility/2006">
                 <mc:Choice xmlns:v="urn:schemas-microsoft-com:vml" Requires="v">
-                  <p:oleObj spid="_x0000_s3149" name="Image" r:id="rId7" imgW="1574280" imgH="1053720" progId="Photoshop.Image.13">
+                  <p:oleObj spid="_x0000_s3153" name="Image" r:id="rId7" imgW="1574280" imgH="1053720" progId="Photoshop.Image.13">
                     <p:embed/>
                   </p:oleObj>
                 </mc:Choice>
@@ -13960,7 +13960,7 @@
               <a:graphicData uri="http://schemas.openxmlformats.org/presentationml/2006/ole">
                 <mc:AlternateContent xmlns:mc="http://schemas.openxmlformats.org/markup-compatibility/2006">
                   <mc:Choice xmlns:v="urn:schemas-microsoft-com:vml" Requires="v">
-                    <p:oleObj spid="_x0000_s3150" name="Image" r:id="rId15" imgW="1828440" imgH="1117440" progId="Photoshop.Image.13">
+                    <p:oleObj spid="_x0000_s3154" name="Image" r:id="rId15" imgW="1828440" imgH="1117440" progId="Photoshop.Image.13">
                       <p:embed/>
                     </p:oleObj>
                   </mc:Choice>
@@ -14017,7 +14017,7 @@
               <a:graphicData uri="http://schemas.openxmlformats.org/presentationml/2006/ole">
                 <mc:AlternateContent xmlns:mc="http://schemas.openxmlformats.org/markup-compatibility/2006">
                   <mc:Choice xmlns:v="urn:schemas-microsoft-com:vml" Requires="v">
-                    <p:oleObj spid="_x0000_s3151" name="Image" r:id="rId17" imgW="1828440" imgH="1117440" progId="Photoshop.Image.13">
+                    <p:oleObj spid="_x0000_s3155" name="Image" r:id="rId17" imgW="1828440" imgH="1117440" progId="Photoshop.Image.13">
                       <p:embed/>
                     </p:oleObj>
                   </mc:Choice>
@@ -14861,7 +14861,7 @@
           <a:p>
             <a:r>
               <a:rPr lang="en-US" dirty="0" smtClean="0"/>
-              <a:t>CONCLUSIONS</a:t>
+              <a:t>CONCLUSIONS AND FUTURE WORK</a:t>
             </a:r>
             <a:endParaRPr lang="en-US" dirty="0"/>
           </a:p>
@@ -16059,6 +16059,73 @@
                 <a:cs typeface="Times New Roman"/>
               </a:rPr>
               <a:t>The Correlation Matrix and Correlation Vector use hue and intensity to show positive and negative correlation over time for pairs of channels.</a:t>
+            </a:r>
+            <a:endParaRPr lang="en-US" sz="2400" dirty="0">
+              <a:latin typeface="Times New Roman"/>
+              <a:cs typeface="Times New Roman"/>
+            </a:endParaRPr>
+          </a:p>
+        </p:txBody>
+      </p:sp>
+      <p:pic>
+        <p:nvPicPr>
+          <p:cNvPr id="7" name="Picture 6" descr="Screen Shot 2015-06-08 at 3.04.58 AM.png"/>
+          <p:cNvPicPr>
+            <a:picLocks noChangeAspect="1"/>
+          </p:cNvPicPr>
+          <p:nvPr/>
+        </p:nvPicPr>
+        <p:blipFill>
+          <a:blip r:embed="rId6">
+            <a:extLst>
+              <a:ext uri="{28A0092B-C50C-407E-A947-70E740481C1C}">
+                <a14:useLocalDpi xmlns:a14="http://schemas.microsoft.com/office/drawing/2010/main" val="0"/>
+              </a:ext>
+            </a:extLst>
+          </a:blip>
+          <a:stretch>
+            <a:fillRect/>
+          </a:stretch>
+        </p:blipFill>
+        <p:spPr>
+          <a:xfrm>
+            <a:off x="26825902" y="29466105"/>
+            <a:ext cx="5168900" cy="2209800"/>
+          </a:xfrm>
+          <a:prstGeom prst="rect">
+            <a:avLst/>
+          </a:prstGeom>
+        </p:spPr>
+      </p:pic>
+      <p:sp>
+        <p:nvSpPr>
+          <p:cNvPr id="27" name="TextBox 26"/>
+          <p:cNvSpPr txBox="1"/>
+          <p:nvPr/>
+        </p:nvSpPr>
+        <p:spPr>
+          <a:xfrm>
+            <a:off x="22101763" y="29806113"/>
+            <a:ext cx="4577088" cy="1569660"/>
+          </a:xfrm>
+          <a:prstGeom prst="rect">
+            <a:avLst/>
+          </a:prstGeom>
+          <a:noFill/>
+        </p:spPr>
+        <p:txBody>
+          <a:bodyPr wrap="square" rtlCol="0">
+            <a:spAutoFit/>
+          </a:bodyPr>
+          <a:lstStyle/>
+          <a:p>
+            <a:pPr algn="r"/>
+            <a:r>
+              <a:rPr lang="en-US" sz="2400" dirty="0" smtClean="0">
+                <a:latin typeface="Times New Roman"/>
+                <a:cs typeface="Times New Roman"/>
+              </a:rPr>
+              <a:t>The Plotting Window displays a dynamically-generated time series of recently received channel data for channels of specific interest.</a:t>
             </a:r>
             <a:endParaRPr lang="en-US" sz="2400" dirty="0">
               <a:latin typeface="Times New Roman"/>

</xml_diff>